<commit_message>
Unify solar wind plotting and update noise panels
</commit_message>
<xml_diff>
--- a/Notes/Notes About Gradieometer.pptx
+++ b/Notes/Notes About Gradieometer.pptx
@@ -12,6 +12,9 @@
     <p:sldId id="260" r:id="rId6"/>
     <p:sldId id="261" r:id="rId7"/>
     <p:sldId id="262" r:id="rId8"/>
+    <p:sldId id="263" r:id="rId9"/>
+    <p:sldId id="264" r:id="rId10"/>
+    <p:sldId id="265" r:id="rId11"/>
   </p:sldIdLst>
   <p:sldSz cx="12192000" cy="6858000"/>
   <p:notesSz cx="6858000" cy="9144000"/>
@@ -3403,6 +3406,152 @@
 </p:sld>
 </file>
 
+<file path=ppt/slides/slide10.xml><?xml version="1.0" encoding="utf-8"?>
+<p:sld xmlns:a="http://schemas.openxmlformats.org/drawingml/2006/main" xmlns:r="http://schemas.openxmlformats.org/officeDocument/2006/relationships" xmlns:p="http://schemas.openxmlformats.org/presentationml/2006/main">
+  <p:cSld>
+    <p:spTree>
+      <p:nvGrpSpPr>
+        <p:cNvPr id="1" name=""/>
+        <p:cNvGrpSpPr/>
+        <p:nvPr/>
+      </p:nvGrpSpPr>
+      <p:grpSpPr>
+        <a:xfrm>
+          <a:off x="0" y="0"/>
+          <a:ext cx="0" cy="0"/>
+          <a:chOff x="0" y="0"/>
+          <a:chExt cx="0" cy="0"/>
+        </a:xfrm>
+      </p:grpSpPr>
+      <p:sp>
+        <p:nvSpPr>
+          <p:cNvPr id="2" name="Title 1">
+            <a:extLst>
+              <a:ext uri="{FF2B5EF4-FFF2-40B4-BE49-F238E27FC236}">
+                <a16:creationId xmlns:a16="http://schemas.microsoft.com/office/drawing/2014/main" id="{C44F7D29-E440-346B-DFAB-FFEDCA6318AA}"/>
+              </a:ext>
+            </a:extLst>
+          </p:cNvPr>
+          <p:cNvSpPr>
+            <a:spLocks noGrp="1"/>
+          </p:cNvSpPr>
+          <p:nvPr>
+            <p:ph type="title"/>
+          </p:nvPr>
+        </p:nvSpPr>
+        <p:spPr/>
+        <p:txBody>
+          <a:bodyPr/>
+          <a:lstStyle/>
+          <a:p>
+            <a:r>
+              <a:rPr lang="en-US" dirty="0"/>
+              <a:t>Solar Wind Noise RMS of 100 km </a:t>
+            </a:r>
+            <a:r>
+              <a:rPr lang="en-US" dirty="0" err="1"/>
+              <a:t>Gradometer</a:t>
+            </a:r>
+            <a:endParaRPr lang="en-US" dirty="0"/>
+          </a:p>
+        </p:txBody>
+      </p:sp>
+      <p:sp>
+        <p:nvSpPr>
+          <p:cNvPr id="3" name="Content Placeholder 2">
+            <a:extLst>
+              <a:ext uri="{FF2B5EF4-FFF2-40B4-BE49-F238E27FC236}">
+                <a16:creationId xmlns:a16="http://schemas.microsoft.com/office/drawing/2014/main" id="{013EF297-C5FC-944D-E2E4-5D72BC9F0A95}"/>
+              </a:ext>
+            </a:extLst>
+          </p:cNvPr>
+          <p:cNvSpPr>
+            <a:spLocks noGrp="1"/>
+          </p:cNvSpPr>
+          <p:nvPr>
+            <p:ph idx="1"/>
+          </p:nvPr>
+        </p:nvSpPr>
+        <p:spPr>
+          <a:xfrm>
+            <a:off x="838200" y="1825625"/>
+            <a:ext cx="3549650" cy="4351338"/>
+          </a:xfrm>
+        </p:spPr>
+        <p:txBody>
+          <a:bodyPr/>
+          <a:lstStyle/>
+          <a:p>
+            <a:r>
+              <a:rPr lang="en-US" dirty="0"/>
+              <a:t>Node transit time: 114.483 s</a:t>
+            </a:r>
+          </a:p>
+          <a:p>
+            <a:r>
+              <a:rPr lang="en-US" dirty="0"/>
+              <a:t>RMS frequency range: 0 to 8.734921e-03 Hz</a:t>
+            </a:r>
+          </a:p>
+          <a:p>
+            <a:r>
+              <a:rPr lang="en-US" dirty="0"/>
+              <a:t>RMS noise: 0.7 </a:t>
+            </a:r>
+            <a:r>
+              <a:rPr lang="en-US" dirty="0" err="1"/>
+              <a:t>fT</a:t>
+            </a:r>
+            <a:r>
+              <a:rPr lang="en-US" dirty="0"/>
+              <a:t>/m</a:t>
+            </a:r>
+          </a:p>
+        </p:txBody>
+      </p:sp>
+      <p:pic>
+        <p:nvPicPr>
+          <p:cNvPr id="5" name="Picture 4" descr="Graphical user interface, histogram&#10;&#10;AI-generated content may be incorrect.">
+            <a:extLst>
+              <a:ext uri="{FF2B5EF4-FFF2-40B4-BE49-F238E27FC236}">
+                <a16:creationId xmlns:a16="http://schemas.microsoft.com/office/drawing/2014/main" id="{30CC4DC7-4C70-F812-4B1D-60F1367A023F}"/>
+              </a:ext>
+            </a:extLst>
+          </p:cNvPr>
+          <p:cNvPicPr>
+            <a:picLocks noChangeAspect="1"/>
+          </p:cNvPicPr>
+          <p:nvPr/>
+        </p:nvPicPr>
+        <p:blipFill>
+          <a:blip r:embed="rId2"/>
+          <a:stretch>
+            <a:fillRect/>
+          </a:stretch>
+        </p:blipFill>
+        <p:spPr>
+          <a:xfrm>
+            <a:off x="4289472" y="1987550"/>
+            <a:ext cx="7318327" cy="3345649"/>
+          </a:xfrm>
+          <a:prstGeom prst="rect">
+            <a:avLst/>
+          </a:prstGeom>
+        </p:spPr>
+      </p:pic>
+    </p:spTree>
+    <p:extLst>
+      <p:ext uri="{BB962C8B-B14F-4D97-AF65-F5344CB8AC3E}">
+        <p14:creationId xmlns:p14="http://schemas.microsoft.com/office/powerpoint/2010/main" val="2452221814"/>
+      </p:ext>
+    </p:extLst>
+  </p:cSld>
+  <p:clrMapOvr>
+    <a:masterClrMapping/>
+  </p:clrMapOvr>
+</p:sld>
+</file>
+
 <file path=ppt/slides/slide2.xml><?xml version="1.0" encoding="utf-8"?>
 <p:sld xmlns:a="http://schemas.openxmlformats.org/drawingml/2006/main" xmlns:r="http://schemas.openxmlformats.org/officeDocument/2006/relationships" xmlns:p="http://schemas.openxmlformats.org/presentationml/2006/main">
   <p:cSld>
@@ -4699,6 +4848,13 @@
           <a:lstStyle/>
           <a:p>
             <a:r>
+              <a:rPr lang="en-US" dirty="0"/>
+              <a:t>5% conductivity, no inductance</a:t>
+            </a:r>
+            <a:br>
+              <a:rPr lang="en-US" dirty="0"/>
+            </a:br>
+            <a:r>
               <a:rPr lang="en-US" dirty="0" err="1"/>
               <a:t>Matplot</a:t>
             </a:r>
@@ -4742,30 +4898,29 @@
           <a:p>
             <a:r>
               <a:rPr lang="en-US" dirty="0"/>
-              <a:t>Py vista has </a:t>
-            </a:r>
-            <a:r>
-              <a:rPr lang="en-US"/>
-              <a:t>interpolation but is </a:t>
-            </a:r>
+              <a:t>Py vista has interpolation but is less clear choose </a:t>
+            </a:r>
+          </a:p>
+          <a:p>
             <a:r>
               <a:rPr lang="en-US" dirty="0"/>
-              <a:t>less clear </a:t>
-            </a:r>
-            <a:r>
-              <a:rPr lang="en-US"/>
-              <a:t>choose </a:t>
-            </a:r>
-          </a:p>
-          <a:p>
-            <a:r>
-              <a:rPr lang="en-US"/>
-              <a:t>matplotlib </a:t>
-            </a:r>
+              <a:t>matplotlib as the default</a:t>
+            </a:r>
+          </a:p>
+          <a:p>
             <a:r>
               <a:rPr lang="en-US" dirty="0"/>
-              <a:t>as the default</a:t>
-            </a:r>
+              <a:t>Few </a:t>
+            </a:r>
+            <a:r>
+              <a:rPr lang="en-US" dirty="0" err="1"/>
+              <a:t>pT</a:t>
+            </a:r>
+            <a:r>
+              <a:rPr lang="en-US"/>
+              <a:t>/m</a:t>
+            </a:r>
+            <a:endParaRPr lang="en-US" dirty="0"/>
           </a:p>
           <a:p>
             <a:endParaRPr lang="en-US" dirty="0"/>
@@ -4901,8 +5056,8 @@
         </p:blipFill>
         <p:spPr>
           <a:xfrm>
-            <a:off x="6319274" y="3297237"/>
-            <a:ext cx="3110476" cy="2927904"/>
+            <a:off x="6459252" y="3428999"/>
+            <a:ext cx="2970497" cy="2796141"/>
           </a:xfrm>
           <a:prstGeom prst="rect">
             <a:avLst/>
@@ -4943,6 +5098,669 @@
     <p:extLst>
       <p:ext uri="{BB962C8B-B14F-4D97-AF65-F5344CB8AC3E}">
         <p14:creationId xmlns:p14="http://schemas.microsoft.com/office/powerpoint/2010/main" val="3439324549"/>
+      </p:ext>
+    </p:extLst>
+  </p:cSld>
+  <p:clrMapOvr>
+    <a:masterClrMapping/>
+  </p:clrMapOvr>
+</p:sld>
+</file>
+
+<file path=ppt/slides/slide8.xml><?xml version="1.0" encoding="utf-8"?>
+<p:sld xmlns:a="http://schemas.openxmlformats.org/drawingml/2006/main" xmlns:r="http://schemas.openxmlformats.org/officeDocument/2006/relationships" xmlns:p="http://schemas.openxmlformats.org/presentationml/2006/main">
+  <p:cSld>
+    <p:spTree>
+      <p:nvGrpSpPr>
+        <p:cNvPr id="1" name=""/>
+        <p:cNvGrpSpPr/>
+        <p:nvPr/>
+      </p:nvGrpSpPr>
+      <p:grpSpPr>
+        <a:xfrm>
+          <a:off x="0" y="0"/>
+          <a:ext cx="0" cy="0"/>
+          <a:chOff x="0" y="0"/>
+          <a:chExt cx="0" cy="0"/>
+        </a:xfrm>
+      </p:grpSpPr>
+      <p:sp>
+        <p:nvSpPr>
+          <p:cNvPr id="2" name="Title 1">
+            <a:extLst>
+              <a:ext uri="{FF2B5EF4-FFF2-40B4-BE49-F238E27FC236}">
+                <a16:creationId xmlns:a16="http://schemas.microsoft.com/office/drawing/2014/main" id="{87C63C76-9113-4FCC-65A5-424B88D3711E}"/>
+              </a:ext>
+            </a:extLst>
+          </p:cNvPr>
+          <p:cNvSpPr>
+            <a:spLocks noGrp="1"/>
+          </p:cNvSpPr>
+          <p:nvPr>
+            <p:ph type="title"/>
+          </p:nvPr>
+        </p:nvSpPr>
+        <p:spPr/>
+        <p:txBody>
+          <a:bodyPr/>
+          <a:lstStyle/>
+          <a:p>
+            <a:r>
+              <a:rPr lang="en-US" dirty="0"/>
+              <a:t>Orbital Considerations</a:t>
+            </a:r>
+          </a:p>
+        </p:txBody>
+      </p:sp>
+      <p:sp>
+        <p:nvSpPr>
+          <p:cNvPr id="3" name="Content Placeholder 2">
+            <a:extLst>
+              <a:ext uri="{FF2B5EF4-FFF2-40B4-BE49-F238E27FC236}">
+                <a16:creationId xmlns:a16="http://schemas.microsoft.com/office/drawing/2014/main" id="{4AB04D30-77B3-6A90-F029-79CBF30D5DB6}"/>
+              </a:ext>
+            </a:extLst>
+          </p:cNvPr>
+          <p:cNvSpPr>
+            <a:spLocks noGrp="1"/>
+          </p:cNvSpPr>
+          <p:nvPr>
+            <p:ph idx="1"/>
+          </p:nvPr>
+        </p:nvSpPr>
+        <p:spPr>
+          <a:xfrm>
+            <a:off x="823764" y="1216025"/>
+            <a:ext cx="2165350" cy="3692525"/>
+          </a:xfrm>
+        </p:spPr>
+        <p:txBody>
+          <a:bodyPr>
+            <a:normAutofit fontScale="40000" lnSpcReduction="20000"/>
+          </a:bodyPr>
+          <a:lstStyle/>
+          <a:p>
+            <a:r>
+              <a:rPr lang="en-US" b="1" dirty="0"/>
+              <a:t>Average crossing interval: 61.521</a:t>
+            </a:r>
+            <a:r>
+              <a:rPr lang="en-US" dirty="0"/>
+              <a:t> hours (221476.7 s)</a:t>
+            </a:r>
+          </a:p>
+          <a:p>
+            <a:r>
+              <a:rPr lang="en-US" dirty="0"/>
+              <a:t>Europa polar circular orbit (100 km altitude)</a:t>
+            </a:r>
+          </a:p>
+          <a:p>
+            <a:r>
+              <a:rPr lang="en-US" dirty="0"/>
+              <a:t>omega = 8.368765e-04 rad/s</a:t>
+            </a:r>
+          </a:p>
+          <a:p>
+            <a:r>
+              <a:rPr lang="en-US" dirty="0"/>
+              <a:t>speed = 1389.215 m/s</a:t>
+            </a:r>
+          </a:p>
+          <a:p>
+            <a:r>
+              <a:rPr lang="en-US" dirty="0"/>
+              <a:t>period = 2.086 hours</a:t>
+            </a:r>
+          </a:p>
+          <a:p>
+            <a:r>
+              <a:rPr lang="en-US" dirty="0"/>
+              <a:t>node mean spacing = 159.042 km</a:t>
+            </a:r>
+          </a:p>
+          <a:p>
+            <a:r>
+              <a:rPr lang="en-US" dirty="0"/>
+              <a:t>node transit time = </a:t>
+            </a:r>
+            <a:r>
+              <a:rPr lang="en-US" b="1" dirty="0"/>
+              <a:t>114.483 s</a:t>
+            </a:r>
+          </a:p>
+          <a:p>
+            <a:r>
+              <a:rPr lang="en-US" dirty="0"/>
+              <a:t>Europa rotation omega = 2.047827e-05 rad/s</a:t>
+            </a:r>
+          </a:p>
+          <a:p>
+            <a:r>
+              <a:rPr lang="en-US" dirty="0"/>
+              <a:t>Europa rotation during orbit = 1.537488e-01 rad</a:t>
+            </a:r>
+          </a:p>
+          <a:p>
+            <a:r>
+              <a:rPr lang="en-US" dirty="0"/>
+              <a:t> </a:t>
+            </a:r>
+          </a:p>
+        </p:txBody>
+      </p:sp>
+      <p:pic>
+        <p:nvPicPr>
+          <p:cNvPr id="5" name="Picture 4" descr="Chart&#10;&#10;AI-generated content may be incorrect.">
+            <a:extLst>
+              <a:ext uri="{FF2B5EF4-FFF2-40B4-BE49-F238E27FC236}">
+                <a16:creationId xmlns:a16="http://schemas.microsoft.com/office/drawing/2014/main" id="{3BE883D5-4A3B-59A5-F67C-40AD3E39FB9E}"/>
+              </a:ext>
+            </a:extLst>
+          </p:cNvPr>
+          <p:cNvPicPr>
+            <a:picLocks noChangeAspect="1"/>
+          </p:cNvPicPr>
+          <p:nvPr/>
+        </p:nvPicPr>
+        <p:blipFill>
+          <a:blip r:embed="rId2"/>
+          <a:stretch>
+            <a:fillRect/>
+          </a:stretch>
+        </p:blipFill>
+        <p:spPr>
+          <a:xfrm>
+            <a:off x="231118" y="4017890"/>
+            <a:ext cx="6189974" cy="2474985"/>
+          </a:xfrm>
+          <a:prstGeom prst="rect">
+            <a:avLst/>
+          </a:prstGeom>
+        </p:spPr>
+      </p:pic>
+      <p:pic>
+        <p:nvPicPr>
+          <p:cNvPr id="7" name="Picture 6">
+            <a:extLst>
+              <a:ext uri="{FF2B5EF4-FFF2-40B4-BE49-F238E27FC236}">
+                <a16:creationId xmlns:a16="http://schemas.microsoft.com/office/drawing/2014/main" id="{7DAB80CA-3750-CB46-48FE-0CFAE0F2672F}"/>
+              </a:ext>
+            </a:extLst>
+          </p:cNvPr>
+          <p:cNvPicPr>
+            <a:picLocks noChangeAspect="1"/>
+          </p:cNvPicPr>
+          <p:nvPr/>
+        </p:nvPicPr>
+        <p:blipFill>
+          <a:blip r:embed="rId3"/>
+          <a:stretch>
+            <a:fillRect/>
+          </a:stretch>
+        </p:blipFill>
+        <p:spPr>
+          <a:xfrm>
+            <a:off x="6421092" y="1144588"/>
+            <a:ext cx="5606691" cy="5032375"/>
+          </a:xfrm>
+          <a:prstGeom prst="rect">
+            <a:avLst/>
+          </a:prstGeom>
+        </p:spPr>
+      </p:pic>
+      <p:sp>
+        <p:nvSpPr>
+          <p:cNvPr id="10" name="Content Placeholder 2">
+            <a:extLst>
+              <a:ext uri="{FF2B5EF4-FFF2-40B4-BE49-F238E27FC236}">
+                <a16:creationId xmlns:a16="http://schemas.microsoft.com/office/drawing/2014/main" id="{7C724EBB-1C59-B0BF-7B27-78717080D1D6}"/>
+              </a:ext>
+            </a:extLst>
+          </p:cNvPr>
+          <p:cNvSpPr txBox="1">
+            <a:spLocks/>
+          </p:cNvSpPr>
+          <p:nvPr/>
+        </p:nvSpPr>
+        <p:spPr>
+          <a:xfrm>
+            <a:off x="3581758" y="1400175"/>
+            <a:ext cx="2463441" cy="2740025"/>
+          </a:xfrm>
+          <a:prstGeom prst="rect">
+            <a:avLst/>
+          </a:prstGeom>
+        </p:spPr>
+        <p:txBody>
+          <a:bodyPr vert="horz" lIns="91440" tIns="45720" rIns="91440" bIns="45720" rtlCol="0">
+            <a:normAutofit fontScale="40000" lnSpcReduction="20000"/>
+          </a:bodyPr>
+          <a:lstStyle>
+            <a:lvl1pPr marL="228600" indent="-228600" algn="l" defTabSz="914400" rtl="0" eaLnBrk="1" latinLnBrk="0" hangingPunct="1">
+              <a:lnSpc>
+                <a:spcPct val="90000"/>
+              </a:lnSpc>
+              <a:spcBef>
+                <a:spcPts val="1000"/>
+              </a:spcBef>
+              <a:buFont typeface="Arial" panose="020B0604020202020204" pitchFamily="34" charset="0"/>
+              <a:buChar char="•"/>
+              <a:defRPr sz="2800" kern="1200">
+                <a:solidFill>
+                  <a:schemeClr val="tx1"/>
+                </a:solidFill>
+                <a:latin typeface="+mn-lt"/>
+                <a:ea typeface="+mn-ea"/>
+                <a:cs typeface="+mn-cs"/>
+              </a:defRPr>
+            </a:lvl1pPr>
+            <a:lvl2pPr marL="685800" indent="-228600" algn="l" defTabSz="914400" rtl="0" eaLnBrk="1" latinLnBrk="0" hangingPunct="1">
+              <a:lnSpc>
+                <a:spcPct val="90000"/>
+              </a:lnSpc>
+              <a:spcBef>
+                <a:spcPts val="500"/>
+              </a:spcBef>
+              <a:buFont typeface="Arial" panose="020B0604020202020204" pitchFamily="34" charset="0"/>
+              <a:buChar char="•"/>
+              <a:defRPr sz="2400" kern="1200">
+                <a:solidFill>
+                  <a:schemeClr val="tx1"/>
+                </a:solidFill>
+                <a:latin typeface="+mn-lt"/>
+                <a:ea typeface="+mn-ea"/>
+                <a:cs typeface="+mn-cs"/>
+              </a:defRPr>
+            </a:lvl2pPr>
+            <a:lvl3pPr marL="1143000" indent="-228600" algn="l" defTabSz="914400" rtl="0" eaLnBrk="1" latinLnBrk="0" hangingPunct="1">
+              <a:lnSpc>
+                <a:spcPct val="90000"/>
+              </a:lnSpc>
+              <a:spcBef>
+                <a:spcPts val="500"/>
+              </a:spcBef>
+              <a:buFont typeface="Arial" panose="020B0604020202020204" pitchFamily="34" charset="0"/>
+              <a:buChar char="•"/>
+              <a:defRPr sz="2000" kern="1200">
+                <a:solidFill>
+                  <a:schemeClr val="tx1"/>
+                </a:solidFill>
+                <a:latin typeface="+mn-lt"/>
+                <a:ea typeface="+mn-ea"/>
+                <a:cs typeface="+mn-cs"/>
+              </a:defRPr>
+            </a:lvl3pPr>
+            <a:lvl4pPr marL="1600200" indent="-228600" algn="l" defTabSz="914400" rtl="0" eaLnBrk="1" latinLnBrk="0" hangingPunct="1">
+              <a:lnSpc>
+                <a:spcPct val="90000"/>
+              </a:lnSpc>
+              <a:spcBef>
+                <a:spcPts val="500"/>
+              </a:spcBef>
+              <a:buFont typeface="Arial" panose="020B0604020202020204" pitchFamily="34" charset="0"/>
+              <a:buChar char="•"/>
+              <a:defRPr sz="1800" kern="1200">
+                <a:solidFill>
+                  <a:schemeClr val="tx1"/>
+                </a:solidFill>
+                <a:latin typeface="+mn-lt"/>
+                <a:ea typeface="+mn-ea"/>
+                <a:cs typeface="+mn-cs"/>
+              </a:defRPr>
+            </a:lvl4pPr>
+            <a:lvl5pPr marL="2057400" indent="-228600" algn="l" defTabSz="914400" rtl="0" eaLnBrk="1" latinLnBrk="0" hangingPunct="1">
+              <a:lnSpc>
+                <a:spcPct val="90000"/>
+              </a:lnSpc>
+              <a:spcBef>
+                <a:spcPts val="500"/>
+              </a:spcBef>
+              <a:buFont typeface="Arial" panose="020B0604020202020204" pitchFamily="34" charset="0"/>
+              <a:buChar char="•"/>
+              <a:defRPr sz="1800" kern="1200">
+                <a:solidFill>
+                  <a:schemeClr val="tx1"/>
+                </a:solidFill>
+                <a:latin typeface="+mn-lt"/>
+                <a:ea typeface="+mn-ea"/>
+                <a:cs typeface="+mn-cs"/>
+              </a:defRPr>
+            </a:lvl5pPr>
+            <a:lvl6pPr marL="2514600" indent="-228600" algn="l" defTabSz="914400" rtl="0" eaLnBrk="1" latinLnBrk="0" hangingPunct="1">
+              <a:lnSpc>
+                <a:spcPct val="90000"/>
+              </a:lnSpc>
+              <a:spcBef>
+                <a:spcPts val="500"/>
+              </a:spcBef>
+              <a:buFont typeface="Arial" panose="020B0604020202020204" pitchFamily="34" charset="0"/>
+              <a:buChar char="•"/>
+              <a:defRPr sz="1800" kern="1200">
+                <a:solidFill>
+                  <a:schemeClr val="tx1"/>
+                </a:solidFill>
+                <a:latin typeface="+mn-lt"/>
+                <a:ea typeface="+mn-ea"/>
+                <a:cs typeface="+mn-cs"/>
+              </a:defRPr>
+            </a:lvl6pPr>
+            <a:lvl7pPr marL="2971800" indent="-228600" algn="l" defTabSz="914400" rtl="0" eaLnBrk="1" latinLnBrk="0" hangingPunct="1">
+              <a:lnSpc>
+                <a:spcPct val="90000"/>
+              </a:lnSpc>
+              <a:spcBef>
+                <a:spcPts val="500"/>
+              </a:spcBef>
+              <a:buFont typeface="Arial" panose="020B0604020202020204" pitchFamily="34" charset="0"/>
+              <a:buChar char="•"/>
+              <a:defRPr sz="1800" kern="1200">
+                <a:solidFill>
+                  <a:schemeClr val="tx1"/>
+                </a:solidFill>
+                <a:latin typeface="+mn-lt"/>
+                <a:ea typeface="+mn-ea"/>
+                <a:cs typeface="+mn-cs"/>
+              </a:defRPr>
+            </a:lvl7pPr>
+            <a:lvl8pPr marL="3429000" indent="-228600" algn="l" defTabSz="914400" rtl="0" eaLnBrk="1" latinLnBrk="0" hangingPunct="1">
+              <a:lnSpc>
+                <a:spcPct val="90000"/>
+              </a:lnSpc>
+              <a:spcBef>
+                <a:spcPts val="500"/>
+              </a:spcBef>
+              <a:buFont typeface="Arial" panose="020B0604020202020204" pitchFamily="34" charset="0"/>
+              <a:buChar char="•"/>
+              <a:defRPr sz="1800" kern="1200">
+                <a:solidFill>
+                  <a:schemeClr val="tx1"/>
+                </a:solidFill>
+                <a:latin typeface="+mn-lt"/>
+                <a:ea typeface="+mn-ea"/>
+                <a:cs typeface="+mn-cs"/>
+              </a:defRPr>
+            </a:lvl8pPr>
+            <a:lvl9pPr marL="3886200" indent="-228600" algn="l" defTabSz="914400" rtl="0" eaLnBrk="1" latinLnBrk="0" hangingPunct="1">
+              <a:lnSpc>
+                <a:spcPct val="90000"/>
+              </a:lnSpc>
+              <a:spcBef>
+                <a:spcPts val="500"/>
+              </a:spcBef>
+              <a:buFont typeface="Arial" panose="020B0604020202020204" pitchFamily="34" charset="0"/>
+              <a:buChar char="•"/>
+              <a:defRPr sz="1800" kern="1200">
+                <a:solidFill>
+                  <a:schemeClr val="tx1"/>
+                </a:solidFill>
+                <a:latin typeface="+mn-lt"/>
+                <a:ea typeface="+mn-ea"/>
+                <a:cs typeface="+mn-cs"/>
+              </a:defRPr>
+            </a:lvl9pPr>
+          </a:lstStyle>
+          <a:p>
+            <a:r>
+              <a:rPr lang="en-US" dirty="0"/>
+              <a:t>node angle (equator) = 9.580832e-02 rad</a:t>
+            </a:r>
+          </a:p>
+          <a:p>
+            <a:r>
+              <a:rPr lang="en-US" dirty="0"/>
+              <a:t>node drift per orbit = 1.605 nodes</a:t>
+            </a:r>
+          </a:p>
+          <a:p>
+            <a:r>
+              <a:rPr lang="en-US" dirty="0"/>
+              <a:t>field period (Jupiter rotation) = 9.925 hours</a:t>
+            </a:r>
+          </a:p>
+          <a:p>
+            <a:r>
+              <a:rPr lang="en-US" dirty="0"/>
+              <a:t>phase coverage gap = 110.480 s</a:t>
+            </a:r>
+          </a:p>
+          <a:p>
+            <a:r>
+              <a:rPr lang="en-US" dirty="0"/>
+              <a:t>phase coverage time = 821.698 hours</a:t>
+            </a:r>
+          </a:p>
+          <a:p>
+            <a:r>
+              <a:rPr lang="en-US" dirty="0"/>
+              <a:t>phase coverage orbits = 394</a:t>
+            </a:r>
+          </a:p>
+          <a:p>
+            <a:r>
+              <a:rPr lang="en-US" dirty="0"/>
+              <a:t>phase bin mean = 0.032</a:t>
+            </a:r>
+          </a:p>
+          <a:p>
+            <a:r>
+              <a:rPr lang="en-US" dirty="0"/>
+              <a:t>phase bin std = 0.176</a:t>
+            </a:r>
+          </a:p>
+        </p:txBody>
+      </p:sp>
+    </p:spTree>
+    <p:extLst>
+      <p:ext uri="{BB962C8B-B14F-4D97-AF65-F5344CB8AC3E}">
+        <p14:creationId xmlns:p14="http://schemas.microsoft.com/office/powerpoint/2010/main" val="2566832428"/>
+      </p:ext>
+    </p:extLst>
+  </p:cSld>
+  <p:clrMapOvr>
+    <a:masterClrMapping/>
+  </p:clrMapOvr>
+</p:sld>
+</file>
+
+<file path=ppt/slides/slide9.xml><?xml version="1.0" encoding="utf-8"?>
+<p:sld xmlns:a="http://schemas.openxmlformats.org/drawingml/2006/main" xmlns:r="http://schemas.openxmlformats.org/officeDocument/2006/relationships" xmlns:p="http://schemas.openxmlformats.org/presentationml/2006/main">
+  <p:cSld>
+    <p:spTree>
+      <p:nvGrpSpPr>
+        <p:cNvPr id="1" name=""/>
+        <p:cNvGrpSpPr/>
+        <p:nvPr/>
+      </p:nvGrpSpPr>
+      <p:grpSpPr>
+        <a:xfrm>
+          <a:off x="0" y="0"/>
+          <a:ext cx="0" cy="0"/>
+          <a:chOff x="0" y="0"/>
+          <a:chExt cx="0" cy="0"/>
+        </a:xfrm>
+      </p:grpSpPr>
+      <p:sp>
+        <p:nvSpPr>
+          <p:cNvPr id="2" name="Title 1">
+            <a:extLst>
+              <a:ext uri="{FF2B5EF4-FFF2-40B4-BE49-F238E27FC236}">
+                <a16:creationId xmlns:a16="http://schemas.microsoft.com/office/drawing/2014/main" id="{9CDA2944-E2BF-FDAC-67FD-041169E739CC}"/>
+              </a:ext>
+            </a:extLst>
+          </p:cNvPr>
+          <p:cNvSpPr>
+            <a:spLocks noGrp="1"/>
+          </p:cNvSpPr>
+          <p:nvPr>
+            <p:ph type="title"/>
+          </p:nvPr>
+        </p:nvSpPr>
+        <p:spPr/>
+        <p:txBody>
+          <a:bodyPr/>
+          <a:lstStyle/>
+          <a:p>
+            <a:r>
+              <a:rPr lang="en-US" dirty="0"/>
+              <a:t>Solar Wind Noise RMS of 10 m boom </a:t>
+            </a:r>
+          </a:p>
+        </p:txBody>
+      </p:sp>
+      <p:sp>
+        <p:nvSpPr>
+          <p:cNvPr id="3" name="Content Placeholder 2">
+            <a:extLst>
+              <a:ext uri="{FF2B5EF4-FFF2-40B4-BE49-F238E27FC236}">
+                <a16:creationId xmlns:a16="http://schemas.microsoft.com/office/drawing/2014/main" id="{EC22A6BD-CFBB-72E9-B8A2-29C84476C0BD}"/>
+              </a:ext>
+            </a:extLst>
+          </p:cNvPr>
+          <p:cNvSpPr>
+            <a:spLocks noGrp="1"/>
+          </p:cNvSpPr>
+          <p:nvPr>
+            <p:ph idx="1"/>
+          </p:nvPr>
+        </p:nvSpPr>
+        <p:spPr>
+          <a:xfrm>
+            <a:off x="838200" y="1825625"/>
+            <a:ext cx="4787900" cy="4351338"/>
+          </a:xfrm>
+        </p:spPr>
+        <p:txBody>
+          <a:bodyPr>
+            <a:normAutofit fontScale="62500" lnSpcReduction="20000"/>
+          </a:bodyPr>
+          <a:lstStyle/>
+          <a:p>
+            <a:endParaRPr lang="en-US" dirty="0"/>
+          </a:p>
+          <a:p>
+            <a:r>
+              <a:rPr lang="en-US" dirty="0"/>
+              <a:t>For 10m, 100km gradiometers Correlations time is well under a second</a:t>
+            </a:r>
+          </a:p>
+          <a:p>
+            <a:r>
+              <a:rPr lang="en-US" dirty="0"/>
+              <a:t>Node transit time: 114.483 s</a:t>
+            </a:r>
+          </a:p>
+          <a:p>
+            <a:r>
+              <a:rPr lang="en-US" dirty="0"/>
+              <a:t>RMS frequency range: 0 to 8.734921e-03 Hz</a:t>
+            </a:r>
+          </a:p>
+          <a:p>
+            <a:r>
+              <a:rPr lang="en-US" dirty="0"/>
+              <a:t>RMS noise: 0.7 </a:t>
+            </a:r>
+            <a:r>
+              <a:rPr lang="en-US" dirty="0" err="1"/>
+              <a:t>fT</a:t>
+            </a:r>
+            <a:r>
+              <a:rPr lang="en-US" dirty="0"/>
+              <a:t>/m</a:t>
+            </a:r>
+          </a:p>
+          <a:p>
+            <a:r>
+              <a:rPr lang="en-US" dirty="0"/>
+              <a:t>ASD = </a:t>
+            </a:r>
+            <a:r>
+              <a:rPr lang="en-US" b="1" dirty="0"/>
+              <a:t>Amplitude Spectral Density</a:t>
+            </a:r>
+          </a:p>
+          <a:p>
+            <a:r>
+              <a:rPr lang="en-US" dirty="0"/>
+              <a:t>Would need 30 </a:t>
+            </a:r>
+            <a:r>
+              <a:rPr lang="en-US" dirty="0" err="1"/>
+              <a:t>fT</a:t>
+            </a:r>
+            <a:r>
+              <a:rPr lang="en-US" dirty="0"/>
+              <a:t> noise to match solar wind reduction</a:t>
+            </a:r>
+          </a:p>
+          <a:p>
+            <a:r>
+              <a:rPr lang="en-US" dirty="0"/>
+              <a:t>However , Gradients from 5% changes in conductivity are at the are at </a:t>
+            </a:r>
+            <a:r>
+              <a:rPr lang="en-US" dirty="0" err="1"/>
+              <a:t>pT</a:t>
+            </a:r>
+            <a:r>
+              <a:rPr lang="en-US" dirty="0"/>
+              <a:t>/m level &gt; 1000 times the solar wind noise</a:t>
+            </a:r>
+          </a:p>
+          <a:p>
+            <a:r>
+              <a:rPr lang="en-US" dirty="0"/>
+              <a:t>So we could get 100s of </a:t>
+            </a:r>
+            <a:r>
+              <a:rPr lang="en-US" dirty="0" err="1"/>
+              <a:t>fT</a:t>
+            </a:r>
+            <a:r>
+              <a:rPr lang="en-US" dirty="0"/>
+              <a:t> and still measure </a:t>
+            </a:r>
+          </a:p>
+          <a:p>
+            <a:endParaRPr lang="en-US" dirty="0"/>
+          </a:p>
+        </p:txBody>
+      </p:sp>
+      <p:pic>
+        <p:nvPicPr>
+          <p:cNvPr id="5" name="Picture 4" descr="Chart, histogram&#10;&#10;AI-generated content may be incorrect.">
+            <a:extLst>
+              <a:ext uri="{FF2B5EF4-FFF2-40B4-BE49-F238E27FC236}">
+                <a16:creationId xmlns:a16="http://schemas.microsoft.com/office/drawing/2014/main" id="{6E2A6E9E-F857-1A4C-A68B-6D34457C2603}"/>
+              </a:ext>
+            </a:extLst>
+          </p:cNvPr>
+          <p:cNvPicPr>
+            <a:picLocks noChangeAspect="1"/>
+          </p:cNvPicPr>
+          <p:nvPr/>
+        </p:nvPicPr>
+        <p:blipFill>
+          <a:blip r:embed="rId2"/>
+          <a:stretch>
+            <a:fillRect/>
+          </a:stretch>
+        </p:blipFill>
+        <p:spPr>
+          <a:xfrm>
+            <a:off x="5905222" y="2470150"/>
+            <a:ext cx="5785127" cy="2599736"/>
+          </a:xfrm>
+          <a:prstGeom prst="rect">
+            <a:avLst/>
+          </a:prstGeom>
+        </p:spPr>
+      </p:pic>
+    </p:spTree>
+    <p:extLst>
+      <p:ext uri="{BB962C8B-B14F-4D97-AF65-F5344CB8AC3E}">
+        <p14:creationId xmlns:p14="http://schemas.microsoft.com/office/powerpoint/2010/main" val="831606140"/>
       </p:ext>
     </p:extLst>
   </p:cSld>

</xml_diff>